<commit_message>
added bfo to source of material entity
</commit_message>
<xml_diff>
--- a/docs/papers/release/Figures/Figure 1.pptx
+++ b/docs/papers/release/Figures/Figure 1.pptx
@@ -194,7 +194,7 @@
             <a:fld id="{DCB0F01B-B7FE-4268-A005-AB7D5822BC14}" type="datetimeFigureOut">
               <a:rPr lang="en-US" smtClean="0"/>
               <a:pPr/>
-              <a:t>10/18/2009</a:t>
+              <a:t>10/26/2009</a:t>
             </a:fld>
             <a:endParaRPr lang="en-US"/>
           </a:p>
@@ -806,7 +806,7 @@
             <a:fld id="{1D8BD707-D9CF-40AE-B4C6-C98DA3205C09}" type="datetimeFigureOut">
               <a:rPr lang="en-US" smtClean="0"/>
               <a:pPr/>
-              <a:t>10/18/2009</a:t>
+              <a:t>10/26/2009</a:t>
             </a:fld>
             <a:endParaRPr lang="en-US"/>
           </a:p>
@@ -973,7 +973,7 @@
             <a:fld id="{1D8BD707-D9CF-40AE-B4C6-C98DA3205C09}" type="datetimeFigureOut">
               <a:rPr lang="en-US" smtClean="0"/>
               <a:pPr/>
-              <a:t>10/18/2009</a:t>
+              <a:t>10/26/2009</a:t>
             </a:fld>
             <a:endParaRPr lang="en-US"/>
           </a:p>
@@ -1150,7 +1150,7 @@
             <a:fld id="{1D8BD707-D9CF-40AE-B4C6-C98DA3205C09}" type="datetimeFigureOut">
               <a:rPr lang="en-US" smtClean="0"/>
               <a:pPr/>
-              <a:t>10/18/2009</a:t>
+              <a:t>10/26/2009</a:t>
             </a:fld>
             <a:endParaRPr lang="en-US"/>
           </a:p>
@@ -1317,7 +1317,7 @@
             <a:fld id="{1D8BD707-D9CF-40AE-B4C6-C98DA3205C09}" type="datetimeFigureOut">
               <a:rPr lang="en-US" smtClean="0"/>
               <a:pPr/>
-              <a:t>10/18/2009</a:t>
+              <a:t>10/26/2009</a:t>
             </a:fld>
             <a:endParaRPr lang="en-US"/>
           </a:p>
@@ -1560,7 +1560,7 @@
             <a:fld id="{1D8BD707-D9CF-40AE-B4C6-C98DA3205C09}" type="datetimeFigureOut">
               <a:rPr lang="en-US" smtClean="0"/>
               <a:pPr/>
-              <a:t>10/18/2009</a:t>
+              <a:t>10/26/2009</a:t>
             </a:fld>
             <a:endParaRPr lang="en-US"/>
           </a:p>
@@ -1845,7 +1845,7 @@
             <a:fld id="{1D8BD707-D9CF-40AE-B4C6-C98DA3205C09}" type="datetimeFigureOut">
               <a:rPr lang="en-US" smtClean="0"/>
               <a:pPr/>
-              <a:t>10/18/2009</a:t>
+              <a:t>10/26/2009</a:t>
             </a:fld>
             <a:endParaRPr lang="en-US"/>
           </a:p>
@@ -2264,7 +2264,7 @@
             <a:fld id="{1D8BD707-D9CF-40AE-B4C6-C98DA3205C09}" type="datetimeFigureOut">
               <a:rPr lang="en-US" smtClean="0"/>
               <a:pPr/>
-              <a:t>10/18/2009</a:t>
+              <a:t>10/26/2009</a:t>
             </a:fld>
             <a:endParaRPr lang="en-US"/>
           </a:p>
@@ -2379,7 +2379,7 @@
             <a:fld id="{1D8BD707-D9CF-40AE-B4C6-C98DA3205C09}" type="datetimeFigureOut">
               <a:rPr lang="en-US" smtClean="0"/>
               <a:pPr/>
-              <a:t>10/18/2009</a:t>
+              <a:t>10/26/2009</a:t>
             </a:fld>
             <a:endParaRPr lang="en-US"/>
           </a:p>
@@ -2471,7 +2471,7 @@
             <a:fld id="{1D8BD707-D9CF-40AE-B4C6-C98DA3205C09}" type="datetimeFigureOut">
               <a:rPr lang="en-US" smtClean="0"/>
               <a:pPr/>
-              <a:t>10/18/2009</a:t>
+              <a:t>10/26/2009</a:t>
             </a:fld>
             <a:endParaRPr lang="en-US"/>
           </a:p>
@@ -2745,7 +2745,7 @@
             <a:fld id="{1D8BD707-D9CF-40AE-B4C6-C98DA3205C09}" type="datetimeFigureOut">
               <a:rPr lang="en-US" smtClean="0"/>
               <a:pPr/>
-              <a:t>10/18/2009</a:t>
+              <a:t>10/26/2009</a:t>
             </a:fld>
             <a:endParaRPr lang="en-US"/>
           </a:p>
@@ -2995,7 +2995,7 @@
             <a:fld id="{1D8BD707-D9CF-40AE-B4C6-C98DA3205C09}" type="datetimeFigureOut">
               <a:rPr lang="en-US" smtClean="0"/>
               <a:pPr/>
-              <a:t>10/18/2009</a:t>
+              <a:t>10/26/2009</a:t>
             </a:fld>
             <a:endParaRPr lang="en-US"/>
           </a:p>
@@ -3205,7 +3205,7 @@
             <a:fld id="{1D8BD707-D9CF-40AE-B4C6-C98DA3205C09}" type="datetimeFigureOut">
               <a:rPr lang="en-US" smtClean="0"/>
               <a:pPr/>
-              <a:t>10/18/2009</a:t>
+              <a:t>10/26/2009</a:t>
             </a:fld>
             <a:endParaRPr lang="en-US"/>
           </a:p>
@@ -3838,8 +3838,8 @@
         </p:nvSpPr>
         <p:spPr>
           <a:xfrm>
-            <a:off x="76200" y="2971800"/>
-            <a:ext cx="1066800" cy="533400"/>
+            <a:off x="76200" y="2819400"/>
+            <a:ext cx="1066800" cy="914400"/>
           </a:xfrm>
           <a:prstGeom prst="roundRect">
             <a:avLst/>
@@ -3870,8 +3870,12 @@
           <a:p>
             <a:pPr algn="ctr"/>
             <a:r>
+              <a:rPr lang="en-US" dirty="0" err="1" smtClean="0"/>
+              <a:t>material_entity</a:t>
+            </a:r>
+            <a:r>
               <a:rPr lang="en-US" dirty="0" smtClean="0"/>
-              <a:t>material entity</a:t>
+              <a:t> (BFO)</a:t>
             </a:r>
             <a:endParaRPr lang="en-US" dirty="0"/>
           </a:p>
@@ -3918,15 +3922,7 @@
             <a:pPr algn="ctr"/>
             <a:r>
               <a:rPr lang="en-US" dirty="0" smtClean="0"/>
-              <a:t>chemical </a:t>
-            </a:r>
-            <a:r>
-              <a:rPr lang="en-US" dirty="0" smtClean="0"/>
-              <a:t> </a:t>
-            </a:r>
-            <a:r>
-              <a:rPr lang="en-US" dirty="0" smtClean="0"/>
-              <a:t>solution</a:t>
+              <a:t>chemical  solution</a:t>
             </a:r>
             <a:endParaRPr lang="en-US" dirty="0"/>
           </a:p>
@@ -3944,7 +3940,7 @@
         <p:spPr>
           <a:xfrm flipV="1">
             <a:off x="1143000" y="2171700"/>
-            <a:ext cx="457200" cy="1066800"/>
+            <a:ext cx="457200" cy="1104900"/>
           </a:xfrm>
           <a:prstGeom prst="straightConnector1">
             <a:avLst/>
@@ -3983,7 +3979,7 @@
         <p:spPr>
           <a:xfrm flipV="1">
             <a:off x="1143000" y="2857500"/>
-            <a:ext cx="457200" cy="381000"/>
+            <a:ext cx="457200" cy="419100"/>
           </a:xfrm>
           <a:prstGeom prst="straightConnector1">
             <a:avLst/>
@@ -4022,7 +4018,7 @@
         <p:spPr>
           <a:xfrm flipV="1">
             <a:off x="1143000" y="800100"/>
-            <a:ext cx="457200" cy="2438400"/>
+            <a:ext cx="457200" cy="2476500"/>
           </a:xfrm>
           <a:prstGeom prst="straightConnector1">
             <a:avLst/>
@@ -4060,8 +4056,8 @@
         </p:nvCxnSpPr>
         <p:spPr>
           <a:xfrm>
-            <a:off x="1143000" y="3238500"/>
-            <a:ext cx="457200" cy="2362200"/>
+            <a:off x="1143000" y="3276600"/>
+            <a:ext cx="457200" cy="2324100"/>
           </a:xfrm>
           <a:prstGeom prst="straightConnector1">
             <a:avLst/>
@@ -4099,8 +4095,8 @@
         </p:nvCxnSpPr>
         <p:spPr>
           <a:xfrm>
-            <a:off x="1143000" y="3238500"/>
-            <a:ext cx="457200" cy="1676400"/>
+            <a:off x="1143000" y="3276600"/>
+            <a:ext cx="457200" cy="1638300"/>
           </a:xfrm>
           <a:prstGeom prst="straightConnector1">
             <a:avLst/>
@@ -4138,8 +4134,8 @@
         </p:nvCxnSpPr>
         <p:spPr>
           <a:xfrm>
-            <a:off x="1143000" y="3238500"/>
-            <a:ext cx="457200" cy="304800"/>
+            <a:off x="1143000" y="3276600"/>
+            <a:ext cx="457200" cy="266700"/>
           </a:xfrm>
           <a:prstGeom prst="straightConnector1">
             <a:avLst/>
@@ -4269,7 +4265,7 @@
         <p:spPr>
           <a:xfrm flipV="1">
             <a:off x="1143000" y="1485900"/>
-            <a:ext cx="457200" cy="1752600"/>
+            <a:ext cx="457200" cy="1790700"/>
           </a:xfrm>
           <a:prstGeom prst="straightConnector1">
             <a:avLst/>
@@ -4361,8 +4357,8 @@
         </p:nvCxnSpPr>
         <p:spPr>
           <a:xfrm>
-            <a:off x="1143000" y="3238500"/>
-            <a:ext cx="457200" cy="990600"/>
+            <a:off x="1143000" y="3276600"/>
+            <a:ext cx="457200" cy="952500"/>
           </a:xfrm>
           <a:prstGeom prst="straightConnector1">
             <a:avLst/>
@@ -5544,7 +5540,7 @@
       </p:grpSpPr>
       <p:pic>
         <p:nvPicPr>
-          <p:cNvPr id="2050" name="Picture 2"/>
+          <p:cNvPr id="1026" name="Picture 2"/>
           <p:cNvPicPr>
             <a:picLocks noChangeAspect="1" noChangeArrowheads="1"/>
           </p:cNvPicPr>
@@ -5559,8 +5555,8 @@
         </p:blipFill>
         <p:spPr bwMode="auto">
           <a:xfrm>
-            <a:off x="53975" y="711200"/>
-            <a:ext cx="9034463" cy="5443538"/>
+            <a:off x="95250" y="369888"/>
+            <a:ext cx="8953500" cy="6126162"/>
           </a:xfrm>
           <a:prstGeom prst="rect">
             <a:avLst/>

</xml_diff>